<commit_message>
added system integration part
</commit_message>
<xml_diff>
--- a/Demo 1/Project Presentation.pptx
+++ b/Demo 1/Project Presentation.pptx
@@ -812,6 +812,90 @@
           <a:bodyPr/>
           <a:lstStyle/>
           <a:p>
+            <a:endParaRPr lang="en-US"/>
+          </a:p>
+        </p:txBody>
+      </p:sp>
+      <p:sp>
+        <p:nvSpPr>
+          <p:cNvPr id="4" name="Slide Number Placeholder 3"/>
+          <p:cNvSpPr>
+            <a:spLocks noGrp="1"/>
+          </p:cNvSpPr>
+          <p:nvPr>
+            <p:ph type="sldNum" sz="quarter" idx="5"/>
+          </p:nvPr>
+        </p:nvSpPr>
+        <p:spPr/>
+        <p:txBody>
+          <a:bodyPr/>
+          <a:lstStyle/>
+          <a:p>
+            <a:fld id="{623251B3-16B9-429B-80E1-A9463491F382}" type="slidenum">
+              <a:rPr lang="en-US" smtClean="0"/>
+              <a:t>3</a:t>
+            </a:fld>
+            <a:endParaRPr lang="en-US"/>
+          </a:p>
+        </p:txBody>
+      </p:sp>
+    </p:spTree>
+    <p:extLst>
+      <p:ext uri="{BB962C8B-B14F-4D97-AF65-F5344CB8AC3E}">
+        <p14:creationId xmlns:p14="http://schemas.microsoft.com/office/powerpoint/2010/main" val="2173648164"/>
+      </p:ext>
+    </p:extLst>
+  </p:cSld>
+  <p:clrMapOvr>
+    <a:masterClrMapping/>
+  </p:clrMapOvr>
+</p:notes>
+</file>
+
+<file path=ppt/notesSlides/notesSlide2.xml><?xml version="1.0" encoding="utf-8"?>
+<p:notes xmlns:a="http://schemas.openxmlformats.org/drawingml/2006/main" xmlns:r="http://schemas.openxmlformats.org/officeDocument/2006/relationships" xmlns:p="http://schemas.openxmlformats.org/presentationml/2006/main">
+  <p:cSld>
+    <p:spTree>
+      <p:nvGrpSpPr>
+        <p:cNvPr id="1" name=""/>
+        <p:cNvGrpSpPr/>
+        <p:nvPr/>
+      </p:nvGrpSpPr>
+      <p:grpSpPr>
+        <a:xfrm>
+          <a:off x="0" y="0"/>
+          <a:ext cx="0" cy="0"/>
+          <a:chOff x="0" y="0"/>
+          <a:chExt cx="0" cy="0"/>
+        </a:xfrm>
+      </p:grpSpPr>
+      <p:sp>
+        <p:nvSpPr>
+          <p:cNvPr id="2" name="Slide Image Placeholder 1"/>
+          <p:cNvSpPr>
+            <a:spLocks noGrp="1" noRot="1" noChangeAspect="1"/>
+          </p:cNvSpPr>
+          <p:nvPr>
+            <p:ph type="sldImg"/>
+          </p:nvPr>
+        </p:nvSpPr>
+        <p:spPr/>
+      </p:sp>
+      <p:sp>
+        <p:nvSpPr>
+          <p:cNvPr id="3" name="Notes Placeholder 2"/>
+          <p:cNvSpPr>
+            <a:spLocks noGrp="1"/>
+          </p:cNvSpPr>
+          <p:nvPr>
+            <p:ph type="body" idx="1"/>
+          </p:nvPr>
+        </p:nvSpPr>
+        <p:spPr/>
+        <p:txBody>
+          <a:bodyPr/>
+          <a:lstStyle/>
+          <a:p>
             <a:r>
               <a:rPr lang="en-US" dirty="0"/>
               <a:t>We use the </a:t>
@@ -7394,6 +7478,15 @@
 <file path=ppt/slides/slide7.xml><?xml version="1.0" encoding="utf-8"?>
 <p:sld xmlns:a="http://schemas.openxmlformats.org/drawingml/2006/main" xmlns:r="http://schemas.openxmlformats.org/officeDocument/2006/relationships" xmlns:p="http://schemas.openxmlformats.org/presentationml/2006/main">
   <p:cSld>
+    <p:bg>
+      <p:bgPr>
+        <a:blipFill>
+          <a:blip r:embed="rId2"/>
+          <a:stretch/>
+        </a:blipFill>
+        <a:effectLst/>
+      </p:bgPr>
+    </p:bg>
     <p:spTree>
       <p:nvGrpSpPr>
         <p:cNvPr id="1" name=""/>
@@ -7424,9 +7517,16 @@
             <p:ph type="title"/>
           </p:nvPr>
         </p:nvSpPr>
-        <p:spPr/>
-        <p:txBody>
-          <a:bodyPr/>
+        <p:spPr>
+          <a:xfrm>
+            <a:off x="825909" y="808055"/>
+            <a:ext cx="3979205" cy="1453363"/>
+          </a:xfrm>
+        </p:spPr>
+        <p:txBody>
+          <a:bodyPr>
+            <a:normAutofit/>
+          </a:bodyPr>
           <a:lstStyle/>
           <a:p>
             <a:r>
@@ -7453,15 +7553,110 @@
             <p:ph idx="1"/>
           </p:nvPr>
         </p:nvSpPr>
-        <p:spPr/>
-        <p:txBody>
-          <a:bodyPr/>
-          <a:lstStyle/>
-          <a:p>
-            <a:endParaRPr lang="en-US"/>
-          </a:p>
-        </p:txBody>
-      </p:sp>
+        <p:spPr>
+          <a:xfrm>
+            <a:off x="802178" y="2261420"/>
+            <a:ext cx="4002936" cy="3637935"/>
+          </a:xfrm>
+        </p:spPr>
+        <p:txBody>
+          <a:bodyPr>
+            <a:normAutofit/>
+          </a:bodyPr>
+          <a:lstStyle/>
+          <a:p>
+            <a:r>
+              <a:rPr lang="en-US" dirty="0"/>
+              <a:t>Sending data from Raspberry Pi to Arduino</a:t>
+            </a:r>
+          </a:p>
+          <a:p>
+            <a:r>
+              <a:rPr lang="en-US" dirty="0"/>
+              <a:t>I2C communication</a:t>
+            </a:r>
+          </a:p>
+          <a:p>
+            <a:r>
+              <a:rPr lang="en-US" dirty="0"/>
+              <a:t>Sending position or error of angles</a:t>
+            </a:r>
+          </a:p>
+          <a:p>
+            <a:r>
+              <a:rPr lang="en-US" dirty="0"/>
+              <a:t>LCD to display data such as position or angles</a:t>
+            </a:r>
+          </a:p>
+          <a:p>
+            <a:endParaRPr lang="en-US" dirty="0"/>
+          </a:p>
+        </p:txBody>
+      </p:sp>
+      <p:pic>
+        <p:nvPicPr>
+          <p:cNvPr id="5" name="Picture 4" descr="A picture containing text, scoreboard, clipart&#10;&#10;Description automatically generated">
+            <a:extLst>
+              <a:ext uri="{FF2B5EF4-FFF2-40B4-BE49-F238E27FC236}">
+                <a16:creationId xmlns:a16="http://schemas.microsoft.com/office/drawing/2014/main" id="{17AADB90-001F-4354-8782-8DCA99D2F0B0}"/>
+              </a:ext>
+            </a:extLst>
+          </p:cNvPr>
+          <p:cNvPicPr>
+            <a:picLocks noChangeAspect="1"/>
+          </p:cNvPicPr>
+          <p:nvPr/>
+        </p:nvPicPr>
+        <p:blipFill>
+          <a:blip r:embed="rId3">
+            <a:extLst>
+              <a:ext uri="{28A0092B-C50C-407E-A947-70E740481C1C}">
+                <a14:useLocalDpi xmlns:a14="http://schemas.microsoft.com/office/drawing/2010/main" val="0"/>
+              </a:ext>
+            </a:extLst>
+          </a:blip>
+          <a:stretch>
+            <a:fillRect/>
+          </a:stretch>
+        </p:blipFill>
+        <p:spPr>
+          <a:xfrm>
+            <a:off x="6381421" y="796413"/>
+            <a:ext cx="3912254" cy="5102943"/>
+          </a:xfrm>
+          <a:prstGeom prst="roundRect">
+            <a:avLst>
+              <a:gd name="adj" fmla="val 4380"/>
+            </a:avLst>
+          </a:prstGeom>
+          <a:ln w="50800" cap="sq" cmpd="dbl">
+            <a:gradFill flip="none" rotWithShape="1">
+              <a:gsLst>
+                <a:gs pos="0">
+                  <a:srgbClr val="FFFFFF"/>
+                </a:gs>
+                <a:gs pos="100000">
+                  <a:schemeClr val="tx1">
+                    <a:alpha val="0"/>
+                  </a:schemeClr>
+                </a:gs>
+              </a:gsLst>
+              <a:path path="circle">
+                <a:fillToRect l="50000" t="50000" r="50000" b="50000"/>
+              </a:path>
+              <a:tileRect/>
+            </a:gradFill>
+            <a:miter lim="800000"/>
+          </a:ln>
+          <a:effectLst>
+            <a:outerShdw blurRad="254000" algn="tl" rotWithShape="0">
+              <a:srgbClr val="000000">
+                <a:alpha val="43000"/>
+              </a:srgbClr>
+            </a:outerShdw>
+          </a:effectLst>
+        </p:spPr>
+      </p:pic>
     </p:spTree>
     <p:extLst>
       <p:ext uri="{BB962C8B-B14F-4D97-AF65-F5344CB8AC3E}">

</xml_diff>

<commit_message>
Added audio to three slides
</commit_message>
<xml_diff>
--- a/Demo 1/Project Presentation.pptx
+++ b/Demo 1/Project Presentation.pptx
@@ -812,7 +812,24 @@
           <a:bodyPr/>
           <a:lstStyle/>
           <a:p>
-            <a:endParaRPr lang="en-US"/>
+            <a:r>
+              <a:rPr lang="en-US" dirty="0">
+                <a:effectLst/>
+                <a:latin typeface="Arial" panose="020B0604020202020204" pitchFamily="34" charset="0"/>
+              </a:rPr>
+              <a:t>Warehouse robots need to be able to follow appropriate paths in order to navigate around their workspace. We will design and build a robot that can follow a path defined by 1" wide blue painter’s tape. The robot must be able to keep its rotational center within 1 foot of the tape at all times. The path to be followed will be approximately as given by the image on the slide. The robot’s success will be determined by how far it is able to make it down the path, and the speed at</a:t>
+            </a:r>
+            <a:br>
+              <a:rPr lang="en-US" dirty="0"/>
+            </a:br>
+            <a:r>
+              <a:rPr lang="en-US" dirty="0">
+                <a:effectLst/>
+                <a:latin typeface="Arial" panose="020B0604020202020204" pitchFamily="34" charset="0"/>
+              </a:rPr>
+              <a:t>which it travels. Note that there is a break in the tape at (5,4). The robot will have to successfully pass over this break. The robot should stop when it reaches the crossed tape at (7,4)</a:t>
+            </a:r>
+            <a:endParaRPr lang="en-US" dirty="0"/>
           </a:p>
         </p:txBody>
       </p:sp>
@@ -833,7 +850,7 @@
           <a:p>
             <a:fld id="{623251B3-16B9-429B-80E1-A9463491F382}" type="slidenum">
               <a:rPr lang="en-US" smtClean="0"/>
-              <a:t>3</a:t>
+              <a:t>2</a:t>
             </a:fld>
             <a:endParaRPr lang="en-US"/>
           </a:p>
@@ -842,7 +859,7 @@
     </p:spTree>
     <p:extLst>
       <p:ext uri="{BB962C8B-B14F-4D97-AF65-F5344CB8AC3E}">
-        <p14:creationId xmlns:p14="http://schemas.microsoft.com/office/powerpoint/2010/main" val="2173648164"/>
+        <p14:creationId xmlns:p14="http://schemas.microsoft.com/office/powerpoint/2010/main" val="159795701"/>
       </p:ext>
     </p:extLst>
   </p:cSld>
@@ -896,6 +913,90 @@
           <a:bodyPr/>
           <a:lstStyle/>
           <a:p>
+            <a:endParaRPr lang="en-US"/>
+          </a:p>
+        </p:txBody>
+      </p:sp>
+      <p:sp>
+        <p:nvSpPr>
+          <p:cNvPr id="4" name="Slide Number Placeholder 3"/>
+          <p:cNvSpPr>
+            <a:spLocks noGrp="1"/>
+          </p:cNvSpPr>
+          <p:nvPr>
+            <p:ph type="sldNum" sz="quarter" idx="5"/>
+          </p:nvPr>
+        </p:nvSpPr>
+        <p:spPr/>
+        <p:txBody>
+          <a:bodyPr/>
+          <a:lstStyle/>
+          <a:p>
+            <a:fld id="{623251B3-16B9-429B-80E1-A9463491F382}" type="slidenum">
+              <a:rPr lang="en-US" smtClean="0"/>
+              <a:t>3</a:t>
+            </a:fld>
+            <a:endParaRPr lang="en-US"/>
+          </a:p>
+        </p:txBody>
+      </p:sp>
+    </p:spTree>
+    <p:extLst>
+      <p:ext uri="{BB962C8B-B14F-4D97-AF65-F5344CB8AC3E}">
+        <p14:creationId xmlns:p14="http://schemas.microsoft.com/office/powerpoint/2010/main" val="2173648164"/>
+      </p:ext>
+    </p:extLst>
+  </p:cSld>
+  <p:clrMapOvr>
+    <a:masterClrMapping/>
+  </p:clrMapOvr>
+</p:notes>
+</file>
+
+<file path=ppt/notesSlides/notesSlide3.xml><?xml version="1.0" encoding="utf-8"?>
+<p:notes xmlns:a="http://schemas.openxmlformats.org/drawingml/2006/main" xmlns:r="http://schemas.openxmlformats.org/officeDocument/2006/relationships" xmlns:p="http://schemas.openxmlformats.org/presentationml/2006/main">
+  <p:cSld>
+    <p:spTree>
+      <p:nvGrpSpPr>
+        <p:cNvPr id="1" name=""/>
+        <p:cNvGrpSpPr/>
+        <p:nvPr/>
+      </p:nvGrpSpPr>
+      <p:grpSpPr>
+        <a:xfrm>
+          <a:off x="0" y="0"/>
+          <a:ext cx="0" cy="0"/>
+          <a:chOff x="0" y="0"/>
+          <a:chExt cx="0" cy="0"/>
+        </a:xfrm>
+      </p:grpSpPr>
+      <p:sp>
+        <p:nvSpPr>
+          <p:cNvPr id="2" name="Slide Image Placeholder 1"/>
+          <p:cNvSpPr>
+            <a:spLocks noGrp="1" noRot="1" noChangeAspect="1"/>
+          </p:cNvSpPr>
+          <p:nvPr>
+            <p:ph type="sldImg"/>
+          </p:nvPr>
+        </p:nvSpPr>
+        <p:spPr/>
+      </p:sp>
+      <p:sp>
+        <p:nvSpPr>
+          <p:cNvPr id="3" name="Notes Placeholder 2"/>
+          <p:cNvSpPr>
+            <a:spLocks noGrp="1"/>
+          </p:cNvSpPr>
+          <p:nvPr>
+            <p:ph type="body" idx="1"/>
+          </p:nvPr>
+        </p:nvSpPr>
+        <p:spPr/>
+        <p:txBody>
+          <a:bodyPr/>
+          <a:lstStyle/>
+          <a:p>
             <a:r>
               <a:rPr lang="en-US" dirty="0"/>
               <a:t>We use the </a:t>
@@ -995,6 +1096,93 @@
     <p:extLst>
       <p:ext uri="{BB962C8B-B14F-4D97-AF65-F5344CB8AC3E}">
         <p14:creationId xmlns:p14="http://schemas.microsoft.com/office/powerpoint/2010/main" val="3947180218"/>
+      </p:ext>
+    </p:extLst>
+  </p:cSld>
+  <p:clrMapOvr>
+    <a:masterClrMapping/>
+  </p:clrMapOvr>
+</p:notes>
+</file>
+
+<file path=ppt/notesSlides/notesSlide4.xml><?xml version="1.0" encoding="utf-8"?>
+<p:notes xmlns:a="http://schemas.openxmlformats.org/drawingml/2006/main" xmlns:r="http://schemas.openxmlformats.org/officeDocument/2006/relationships" xmlns:p="http://schemas.openxmlformats.org/presentationml/2006/main">
+  <p:cSld>
+    <p:spTree>
+      <p:nvGrpSpPr>
+        <p:cNvPr id="1" name=""/>
+        <p:cNvGrpSpPr/>
+        <p:nvPr/>
+      </p:nvGrpSpPr>
+      <p:grpSpPr>
+        <a:xfrm>
+          <a:off x="0" y="0"/>
+          <a:ext cx="0" cy="0"/>
+          <a:chOff x="0" y="0"/>
+          <a:chExt cx="0" cy="0"/>
+        </a:xfrm>
+      </p:grpSpPr>
+      <p:sp>
+        <p:nvSpPr>
+          <p:cNvPr id="2" name="Slide Image Placeholder 1"/>
+          <p:cNvSpPr>
+            <a:spLocks noGrp="1" noRot="1" noChangeAspect="1"/>
+          </p:cNvSpPr>
+          <p:nvPr>
+            <p:ph type="sldImg"/>
+          </p:nvPr>
+        </p:nvSpPr>
+        <p:spPr/>
+      </p:sp>
+      <p:sp>
+        <p:nvSpPr>
+          <p:cNvPr id="3" name="Notes Placeholder 2"/>
+          <p:cNvSpPr>
+            <a:spLocks noGrp="1"/>
+          </p:cNvSpPr>
+          <p:nvPr>
+            <p:ph type="body" idx="1"/>
+          </p:nvPr>
+        </p:nvSpPr>
+        <p:spPr/>
+        <p:txBody>
+          <a:bodyPr/>
+          <a:lstStyle/>
+          <a:p>
+            <a:r>
+              <a:rPr lang="en-US" dirty="0"/>
+              <a:t>To make the robot able to interact with the world and get real time feedback we use OpenCV to implement our computer vision. The first step is to start recording video. As the video is recorded each frame has a distortion calibration matrix run on it to remove any fish eye effects the camera might have. After that, a specific color is filtered out of the image (the blue for the tape that is to be followed) and then noise reduction is done. From there the remaining contours of the image are found. The largest contour is assumed to be the tape that needs to be followed and so the angle of that largest contour away from the center of the screen is found to tell the robot what direction to turn and by how much.</a:t>
+            </a:r>
+          </a:p>
+        </p:txBody>
+      </p:sp>
+      <p:sp>
+        <p:nvSpPr>
+          <p:cNvPr id="4" name="Slide Number Placeholder 3"/>
+          <p:cNvSpPr>
+            <a:spLocks noGrp="1"/>
+          </p:cNvSpPr>
+          <p:nvPr>
+            <p:ph type="sldNum" sz="quarter" idx="5"/>
+          </p:nvPr>
+        </p:nvSpPr>
+        <p:spPr/>
+        <p:txBody>
+          <a:bodyPr/>
+          <a:lstStyle/>
+          <a:p>
+            <a:fld id="{623251B3-16B9-429B-80E1-A9463491F382}" type="slidenum">
+              <a:rPr lang="en-US" smtClean="0"/>
+              <a:t>6</a:t>
+            </a:fld>
+            <a:endParaRPr lang="en-US"/>
+          </a:p>
+        </p:txBody>
+      </p:sp>
+    </p:spTree>
+    <p:extLst>
+      <p:ext uri="{BB962C8B-B14F-4D97-AF65-F5344CB8AC3E}">
+        <p14:creationId xmlns:p14="http://schemas.microsoft.com/office/powerpoint/2010/main" val="3398530726"/>
       </p:ext>
     </p:extLst>
   </p:cSld>
@@ -6913,6 +7101,74 @@
           </a:p>
         </p:txBody>
       </p:sp>
+      <p:pic>
+        <p:nvPicPr>
+          <p:cNvPr id="5" name="Picture 4">
+            <a:extLst>
+              <a:ext uri="{FF2B5EF4-FFF2-40B4-BE49-F238E27FC236}">
+                <a16:creationId xmlns:a16="http://schemas.microsoft.com/office/drawing/2014/main" id="{482CBE9F-0E9F-4CAE-A18E-848EE8F940D1}"/>
+              </a:ext>
+            </a:extLst>
+          </p:cNvPr>
+          <p:cNvPicPr>
+            <a:picLocks noChangeAspect="1"/>
+          </p:cNvPicPr>
+          <p:nvPr/>
+        </p:nvPicPr>
+        <p:blipFill>
+          <a:blip r:embed="rId5"/>
+          <a:stretch>
+            <a:fillRect/>
+          </a:stretch>
+        </p:blipFill>
+        <p:spPr>
+          <a:xfrm>
+            <a:off x="5493895" y="1075667"/>
+            <a:ext cx="6335009" cy="4715533"/>
+          </a:xfrm>
+          <a:prstGeom prst="rect">
+            <a:avLst/>
+          </a:prstGeom>
+        </p:spPr>
+      </p:pic>
+      <p:pic>
+        <p:nvPicPr>
+          <p:cNvPr id="6" name="Recorded Sound">
+            <a:hlinkClick r:id="" action="ppaction://media"/>
+            <a:extLst>
+              <a:ext uri="{FF2B5EF4-FFF2-40B4-BE49-F238E27FC236}">
+                <a16:creationId xmlns:a16="http://schemas.microsoft.com/office/drawing/2014/main" id="{8E7346AE-2D8B-4BBD-8AAA-22958B521941}"/>
+              </a:ext>
+            </a:extLst>
+          </p:cNvPr>
+          <p:cNvPicPr>
+            <a:picLocks noChangeAspect="1"/>
+          </p:cNvPicPr>
+          <p:nvPr>
+            <a:audioFile r:link="rId2"/>
+            <p:extLst>
+              <p:ext uri="{DAA4B4D4-6D71-4841-9C94-3DE7FCFB9230}">
+                <p14:media xmlns:p14="http://schemas.microsoft.com/office/powerpoint/2010/main" r:embed="rId1"/>
+              </p:ext>
+            </p:extLst>
+          </p:nvPr>
+        </p:nvPicPr>
+        <p:blipFill>
+          <a:blip r:embed="rId6"/>
+          <a:stretch>
+            <a:fillRect/>
+          </a:stretch>
+        </p:blipFill>
+        <p:spPr>
+          <a:xfrm>
+            <a:off x="685801" y="5664200"/>
+            <a:ext cx="609600" cy="609600"/>
+          </a:xfrm>
+          <a:prstGeom prst="rect">
+            <a:avLst/>
+          </a:prstGeom>
+        </p:spPr>
+      </p:pic>
     </p:spTree>
     <p:extLst>
       <p:ext uri="{BB962C8B-B14F-4D97-AF65-F5344CB8AC3E}">
@@ -6923,6 +7179,101 @@
   <p:clrMapOvr>
     <a:masterClrMapping/>
   </p:clrMapOvr>
+  <mc:AlternateContent xmlns:mc="http://schemas.openxmlformats.org/markup-compatibility/2006">
+    <mc:Choice xmlns:p14="http://schemas.microsoft.com/office/powerpoint/2010/main" Requires="p14">
+      <p:transition spd="slow" p14:dur="2000" advTm="36414"/>
+    </mc:Choice>
+    <mc:Fallback>
+      <p:transition spd="slow" advTm="36414"/>
+    </mc:Fallback>
+  </mc:AlternateContent>
+  <p:timing>
+    <p:tnLst>
+      <p:par>
+        <p:cTn id="1" dur="indefinite" restart="never" nodeType="tmRoot">
+          <p:childTnLst>
+            <p:seq concurrent="1" nextAc="seek">
+              <p:cTn id="2" dur="indefinite" nodeType="mainSeq">
+                <p:childTnLst>
+                  <p:par>
+                    <p:cTn id="3" fill="hold">
+                      <p:stCondLst>
+                        <p:cond delay="indefinite"/>
+                        <p:cond evt="onBegin" delay="0">
+                          <p:tn val="2"/>
+                        </p:cond>
+                      </p:stCondLst>
+                      <p:childTnLst>
+                        <p:par>
+                          <p:cTn id="4" fill="hold">
+                            <p:stCondLst>
+                              <p:cond delay="0"/>
+                            </p:stCondLst>
+                            <p:childTnLst>
+                              <p:par>
+                                <p:cTn id="5" presetID="1" presetClass="mediacall" presetSubtype="0" fill="hold" nodeType="afterEffect">
+                                  <p:stCondLst>
+                                    <p:cond delay="0"/>
+                                  </p:stCondLst>
+                                  <p:childTnLst>
+                                    <p:cmd type="call" cmd="playFrom(0.0)">
+                                      <p:cBhvr>
+                                        <p:cTn id="6" dur="36414" fill="hold"/>
+                                        <p:tgtEl>
+                                          <p:spTgt spid="6"/>
+                                        </p:tgtEl>
+                                      </p:cBhvr>
+                                    </p:cmd>
+                                  </p:childTnLst>
+                                </p:cTn>
+                              </p:par>
+                            </p:childTnLst>
+                          </p:cTn>
+                        </p:par>
+                      </p:childTnLst>
+                    </p:cTn>
+                  </p:par>
+                </p:childTnLst>
+              </p:cTn>
+              <p:prevCondLst>
+                <p:cond evt="onPrev" delay="0">
+                  <p:tgtEl>
+                    <p:sldTgt/>
+                  </p:tgtEl>
+                </p:cond>
+              </p:prevCondLst>
+              <p:nextCondLst>
+                <p:cond evt="onNext" delay="0">
+                  <p:tgtEl>
+                    <p:sldTgt/>
+                  </p:tgtEl>
+                </p:cond>
+              </p:nextCondLst>
+            </p:seq>
+            <p:audio>
+              <p:cMediaNode vol="80000">
+                <p:cTn id="7" fill="hold" display="0">
+                  <p:stCondLst>
+                    <p:cond delay="indefinite"/>
+                  </p:stCondLst>
+                  <p:endCondLst>
+                    <p:cond evt="onStopAudio" delay="0">
+                      <p:tgtEl>
+                        <p:sldTgt/>
+                      </p:tgtEl>
+                    </p:cond>
+                  </p:endCondLst>
+                </p:cTn>
+                <p:tgtEl>
+                  <p:spTgt spid="6"/>
+                </p:tgtEl>
+              </p:cMediaNode>
+            </p:audio>
+          </p:childTnLst>
+        </p:cTn>
+      </p:par>
+    </p:tnLst>
+  </p:timing>
 </p:sld>
 </file>
 
@@ -7011,6 +7362,44 @@
           </a:p>
         </p:txBody>
       </p:sp>
+      <p:pic>
+        <p:nvPicPr>
+          <p:cNvPr id="4" name="Recorded Sound">
+            <a:hlinkClick r:id="" action="ppaction://media"/>
+            <a:extLst>
+              <a:ext uri="{FF2B5EF4-FFF2-40B4-BE49-F238E27FC236}">
+                <a16:creationId xmlns:a16="http://schemas.microsoft.com/office/drawing/2014/main" id="{97C60A36-DF91-4CDC-AEA9-1C45B15C145A}"/>
+              </a:ext>
+            </a:extLst>
+          </p:cNvPr>
+          <p:cNvPicPr>
+            <a:picLocks noChangeAspect="1"/>
+          </p:cNvPicPr>
+          <p:nvPr>
+            <a:audioFile r:link="rId2"/>
+            <p:extLst>
+              <p:ext uri="{DAA4B4D4-6D71-4841-9C94-3DE7FCFB9230}">
+                <p14:media xmlns:p14="http://schemas.microsoft.com/office/powerpoint/2010/main" r:embed="rId1"/>
+              </p:ext>
+            </p:extLst>
+          </p:nvPr>
+        </p:nvPicPr>
+        <p:blipFill>
+          <a:blip r:embed="rId5"/>
+          <a:stretch>
+            <a:fillRect/>
+          </a:stretch>
+        </p:blipFill>
+        <p:spPr>
+          <a:xfrm>
+            <a:off x="765174" y="4991100"/>
+            <a:ext cx="609600" cy="609600"/>
+          </a:xfrm>
+          <a:prstGeom prst="rect">
+            <a:avLst/>
+          </a:prstGeom>
+        </p:spPr>
+      </p:pic>
     </p:spTree>
     <p:extLst>
       <p:ext uri="{BB962C8B-B14F-4D97-AF65-F5344CB8AC3E}">
@@ -7021,6 +7410,101 @@
   <p:clrMapOvr>
     <a:masterClrMapping/>
   </p:clrMapOvr>
+  <mc:AlternateContent xmlns:mc="http://schemas.openxmlformats.org/markup-compatibility/2006">
+    <mc:Choice xmlns:p14="http://schemas.microsoft.com/office/powerpoint/2010/main" Requires="p14">
+      <p:transition spd="slow" p14:dur="2000" advTm="17359"/>
+    </mc:Choice>
+    <mc:Fallback>
+      <p:transition spd="slow" advTm="17359"/>
+    </mc:Fallback>
+  </mc:AlternateContent>
+  <p:timing>
+    <p:tnLst>
+      <p:par>
+        <p:cTn id="1" dur="indefinite" restart="never" nodeType="tmRoot">
+          <p:childTnLst>
+            <p:seq concurrent="1" nextAc="seek">
+              <p:cTn id="2" dur="indefinite" nodeType="mainSeq">
+                <p:childTnLst>
+                  <p:par>
+                    <p:cTn id="3" fill="hold">
+                      <p:stCondLst>
+                        <p:cond delay="indefinite"/>
+                        <p:cond evt="onBegin" delay="0">
+                          <p:tn val="2"/>
+                        </p:cond>
+                      </p:stCondLst>
+                      <p:childTnLst>
+                        <p:par>
+                          <p:cTn id="4" fill="hold">
+                            <p:stCondLst>
+                              <p:cond delay="0"/>
+                            </p:stCondLst>
+                            <p:childTnLst>
+                              <p:par>
+                                <p:cTn id="5" presetID="1" presetClass="mediacall" presetSubtype="0" fill="hold" nodeType="afterEffect">
+                                  <p:stCondLst>
+                                    <p:cond delay="0"/>
+                                  </p:stCondLst>
+                                  <p:childTnLst>
+                                    <p:cmd type="call" cmd="playFrom(0.0)">
+                                      <p:cBhvr>
+                                        <p:cTn id="6" dur="17359" fill="hold"/>
+                                        <p:tgtEl>
+                                          <p:spTgt spid="4"/>
+                                        </p:tgtEl>
+                                      </p:cBhvr>
+                                    </p:cmd>
+                                  </p:childTnLst>
+                                </p:cTn>
+                              </p:par>
+                            </p:childTnLst>
+                          </p:cTn>
+                        </p:par>
+                      </p:childTnLst>
+                    </p:cTn>
+                  </p:par>
+                </p:childTnLst>
+              </p:cTn>
+              <p:prevCondLst>
+                <p:cond evt="onPrev" delay="0">
+                  <p:tgtEl>
+                    <p:sldTgt/>
+                  </p:tgtEl>
+                </p:cond>
+              </p:prevCondLst>
+              <p:nextCondLst>
+                <p:cond evt="onNext" delay="0">
+                  <p:tgtEl>
+                    <p:sldTgt/>
+                  </p:tgtEl>
+                </p:cond>
+              </p:nextCondLst>
+            </p:seq>
+            <p:audio>
+              <p:cMediaNode vol="80000">
+                <p:cTn id="7" fill="hold" display="0">
+                  <p:stCondLst>
+                    <p:cond delay="indefinite"/>
+                  </p:stCondLst>
+                  <p:endCondLst>
+                    <p:cond evt="onStopAudio" delay="0">
+                      <p:tgtEl>
+                        <p:sldTgt/>
+                      </p:tgtEl>
+                    </p:cond>
+                  </p:endCondLst>
+                </p:cTn>
+                <p:tgtEl>
+                  <p:spTgt spid="4"/>
+                </p:tgtEl>
+              </p:cMediaNode>
+            </p:audio>
+          </p:childTnLst>
+        </p:cTn>
+      </p:par>
+    </p:tnLst>
+  </p:timing>
 </p:sld>
 </file>
 
@@ -7359,13 +7843,19 @@
           <a:p>
             <a:r>
               <a:rPr lang="en-US" dirty="0"/>
+              <a:t>Distortion Correction</a:t>
+            </a:r>
+          </a:p>
+          <a:p>
+            <a:r>
+              <a:rPr lang="en-US" dirty="0"/>
               <a:t>Color filtering</a:t>
             </a:r>
           </a:p>
           <a:p>
             <a:r>
               <a:rPr lang="en-US" dirty="0"/>
-              <a:t>Distortion Correction</a:t>
+              <a:t>Noise Reduction</a:t>
             </a:r>
           </a:p>
           <a:p>
@@ -7378,12 +7868,6 @@
             <a:r>
               <a:rPr lang="en-US" dirty="0"/>
               <a:t>Angle detection</a:t>
-            </a:r>
-          </a:p>
-          <a:p>
-            <a:r>
-              <a:rPr lang="en-US" dirty="0"/>
-              <a:t>Noise Reduction</a:t>
             </a:r>
           </a:p>
           <a:p>
@@ -7406,7 +7890,7 @@
           <p:nvPr/>
         </p:nvPicPr>
         <p:blipFill>
-          <a:blip r:embed="rId2">
+          <a:blip r:embed="rId5">
             <a:extLst>
               <a:ext uri="{28A0092B-C50C-407E-A947-70E740481C1C}">
                 <a14:useLocalDpi xmlns:a14="http://schemas.microsoft.com/office/drawing/2010/main" val="0"/>
@@ -7442,7 +7926,7 @@
           <p:nvPr/>
         </p:nvPicPr>
         <p:blipFill rotWithShape="1">
-          <a:blip r:embed="rId3">
+          <a:blip r:embed="rId6">
             <a:extLst>
               <a:ext uri="{28A0092B-C50C-407E-A947-70E740481C1C}">
                 <a14:useLocalDpi xmlns:a14="http://schemas.microsoft.com/office/drawing/2010/main" val="0"/>
@@ -7462,6 +7946,44 @@
           </a:prstGeom>
         </p:spPr>
       </p:pic>
+      <p:pic>
+        <p:nvPicPr>
+          <p:cNvPr id="6" name="CV Slide">
+            <a:hlinkClick r:id="" action="ppaction://media"/>
+            <a:extLst>
+              <a:ext uri="{FF2B5EF4-FFF2-40B4-BE49-F238E27FC236}">
+                <a16:creationId xmlns:a16="http://schemas.microsoft.com/office/drawing/2014/main" id="{581B93FA-D104-43B6-8444-FFDE8816B29E}"/>
+              </a:ext>
+            </a:extLst>
+          </p:cNvPr>
+          <p:cNvPicPr>
+            <a:picLocks noChangeAspect="1"/>
+          </p:cNvPicPr>
+          <p:nvPr>
+            <a:audioFile r:link="rId2"/>
+            <p:extLst>
+              <p:ext uri="{DAA4B4D4-6D71-4841-9C94-3DE7FCFB9230}">
+                <p14:media xmlns:p14="http://schemas.microsoft.com/office/powerpoint/2010/main" r:embed="rId1"/>
+              </p:ext>
+            </p:extLst>
+          </p:nvPr>
+        </p:nvPicPr>
+        <p:blipFill>
+          <a:blip r:embed="rId7"/>
+          <a:stretch>
+            <a:fillRect/>
+          </a:stretch>
+        </p:blipFill>
+        <p:spPr>
+          <a:xfrm>
+            <a:off x="1145750" y="5397500"/>
+            <a:ext cx="609600" cy="609600"/>
+          </a:xfrm>
+          <a:prstGeom prst="rect">
+            <a:avLst/>
+          </a:prstGeom>
+        </p:spPr>
+      </p:pic>
     </p:spTree>
     <p:extLst>
       <p:ext uri="{BB962C8B-B14F-4D97-AF65-F5344CB8AC3E}">
@@ -7472,6 +7994,101 @@
   <p:clrMapOvr>
     <a:masterClrMapping/>
   </p:clrMapOvr>
+  <mc:AlternateContent xmlns:mc="http://schemas.openxmlformats.org/markup-compatibility/2006" xmlns:p14="http://schemas.microsoft.com/office/powerpoint/2010/main">
+    <mc:Choice Requires="p14">
+      <p:transition spd="slow" p14:dur="2000" advTm="40782"/>
+    </mc:Choice>
+    <mc:Fallback xmlns="">
+      <p:transition spd="slow" advTm="40782"/>
+    </mc:Fallback>
+  </mc:AlternateContent>
+  <p:timing>
+    <p:tnLst>
+      <p:par>
+        <p:cTn id="1" dur="indefinite" restart="never" nodeType="tmRoot">
+          <p:childTnLst>
+            <p:seq concurrent="1" nextAc="seek">
+              <p:cTn id="2" dur="indefinite" nodeType="mainSeq">
+                <p:childTnLst>
+                  <p:par>
+                    <p:cTn id="3" fill="hold">
+                      <p:stCondLst>
+                        <p:cond delay="indefinite"/>
+                        <p:cond evt="onBegin" delay="0">
+                          <p:tn val="2"/>
+                        </p:cond>
+                      </p:stCondLst>
+                      <p:childTnLst>
+                        <p:par>
+                          <p:cTn id="4" fill="hold">
+                            <p:stCondLst>
+                              <p:cond delay="0"/>
+                            </p:stCondLst>
+                            <p:childTnLst>
+                              <p:par>
+                                <p:cTn id="5" presetID="1" presetClass="mediacall" presetSubtype="0" fill="hold" nodeType="afterEffect">
+                                  <p:stCondLst>
+                                    <p:cond delay="0"/>
+                                  </p:stCondLst>
+                                  <p:childTnLst>
+                                    <p:cmd type="call" cmd="playFrom(0.0)">
+                                      <p:cBhvr>
+                                        <p:cTn id="6" dur="40782" fill="hold"/>
+                                        <p:tgtEl>
+                                          <p:spTgt spid="6"/>
+                                        </p:tgtEl>
+                                      </p:cBhvr>
+                                    </p:cmd>
+                                  </p:childTnLst>
+                                </p:cTn>
+                              </p:par>
+                            </p:childTnLst>
+                          </p:cTn>
+                        </p:par>
+                      </p:childTnLst>
+                    </p:cTn>
+                  </p:par>
+                </p:childTnLst>
+              </p:cTn>
+              <p:prevCondLst>
+                <p:cond evt="onPrev" delay="0">
+                  <p:tgtEl>
+                    <p:sldTgt/>
+                  </p:tgtEl>
+                </p:cond>
+              </p:prevCondLst>
+              <p:nextCondLst>
+                <p:cond evt="onNext" delay="0">
+                  <p:tgtEl>
+                    <p:sldTgt/>
+                  </p:tgtEl>
+                </p:cond>
+              </p:nextCondLst>
+            </p:seq>
+            <p:audio>
+              <p:cMediaNode vol="100000">
+                <p:cTn id="7" fill="hold" display="0">
+                  <p:stCondLst>
+                    <p:cond delay="indefinite"/>
+                  </p:stCondLst>
+                  <p:endCondLst>
+                    <p:cond evt="onStopAudio" delay="0">
+                      <p:tgtEl>
+                        <p:sldTgt/>
+                      </p:tgtEl>
+                    </p:cond>
+                  </p:endCondLst>
+                </p:cTn>
+                <p:tgtEl>
+                  <p:spTgt spid="6"/>
+                </p:tgtEl>
+              </p:cMediaNode>
+            </p:audio>
+          </p:childTnLst>
+        </p:cTn>
+      </p:par>
+    </p:tnLst>
+  </p:timing>
 </p:sld>
 </file>
 
@@ -7667,6 +8284,14 @@
   <p:clrMapOvr>
     <a:masterClrMapping/>
   </p:clrMapOvr>
+  <mc:AlternateContent xmlns:mc="http://schemas.openxmlformats.org/markup-compatibility/2006" xmlns:p14="http://schemas.microsoft.com/office/powerpoint/2010/main">
+    <mc:Choice Requires="p14">
+      <p:transition spd="slow" p14:dur="2000" advTm="4585"/>
+    </mc:Choice>
+    <mc:Fallback xmlns="">
+      <p:transition spd="slow" advTm="4585"/>
+    </mc:Fallback>
+  </mc:AlternateContent>
 </p:sld>
 </file>
 

</xml_diff>